<commit_message>
Module-qualify only exported functions
</commit_message>
<xml_diff>
--- a/AvoidingVersionChaos.pptx
+++ b/AvoidingVersionChaos.pptx
@@ -238,7 +238,7 @@
           <a:p>
             <a:fld id="{29D46A4A-B867-4860-B9BC-390268574656}" type="datetimeFigureOut">
               <a:rPr lang="en-US" smtClean="0"/>
-              <a:t>3/19/2016</a:t>
+              <a:t>5/3/2016</a:t>
             </a:fld>
             <a:endParaRPr lang="en-US"/>
           </a:p>
@@ -1630,7 +1630,7 @@
           <a:p>
             <a:fld id="{323FFD78-B649-4F70-999C-B1ECA0A6F175}" type="datetimeFigureOut">
               <a:rPr lang="en-US" smtClean="0"/>
-              <a:t>3/19/2016</a:t>
+              <a:t>5/3/2016</a:t>
             </a:fld>
             <a:endParaRPr lang="en-US"/>
           </a:p>
@@ -1838,7 +1838,7 @@
           <a:p>
             <a:fld id="{323FFD78-B649-4F70-999C-B1ECA0A6F175}" type="datetimeFigureOut">
               <a:rPr lang="en-US" smtClean="0"/>
-              <a:t>3/19/2016</a:t>
+              <a:t>5/3/2016</a:t>
             </a:fld>
             <a:endParaRPr lang="en-US"/>
           </a:p>
@@ -2094,7 +2094,7 @@
           <a:p>
             <a:fld id="{323FFD78-B649-4F70-999C-B1ECA0A6F175}" type="datetimeFigureOut">
               <a:rPr lang="en-US" smtClean="0"/>
-              <a:t>3/19/2016</a:t>
+              <a:t>5/3/2016</a:t>
             </a:fld>
             <a:endParaRPr lang="en-US"/>
           </a:p>
@@ -2264,7 +2264,7 @@
           <a:p>
             <a:fld id="{323FFD78-B649-4F70-999C-B1ECA0A6F175}" type="datetimeFigureOut">
               <a:rPr lang="en-US" smtClean="0"/>
-              <a:t>3/19/2016</a:t>
+              <a:t>5/3/2016</a:t>
             </a:fld>
             <a:endParaRPr lang="en-US"/>
           </a:p>
@@ -2607,7 +2607,7 @@
           <a:p>
             <a:fld id="{323FFD78-B649-4F70-999C-B1ECA0A6F175}" type="datetimeFigureOut">
               <a:rPr lang="en-US" smtClean="0"/>
-              <a:t>3/19/2016</a:t>
+              <a:t>5/3/2016</a:t>
             </a:fld>
             <a:endParaRPr lang="en-US"/>
           </a:p>
@@ -2882,7 +2882,7 @@
           <a:p>
             <a:fld id="{323FFD78-B649-4F70-999C-B1ECA0A6F175}" type="datetimeFigureOut">
               <a:rPr lang="en-US" smtClean="0"/>
-              <a:t>3/19/2016</a:t>
+              <a:t>5/3/2016</a:t>
             </a:fld>
             <a:endParaRPr lang="en-US"/>
           </a:p>
@@ -3261,7 +3261,7 @@
           <a:p>
             <a:fld id="{323FFD78-B649-4F70-999C-B1ECA0A6F175}" type="datetimeFigureOut">
               <a:rPr lang="en-US" smtClean="0"/>
-              <a:t>3/19/2016</a:t>
+              <a:t>5/3/2016</a:t>
             </a:fld>
             <a:endParaRPr lang="en-US"/>
           </a:p>
@@ -3379,7 +3379,7 @@
           <a:p>
             <a:fld id="{323FFD78-B649-4F70-999C-B1ECA0A6F175}" type="datetimeFigureOut">
               <a:rPr lang="en-US" smtClean="0"/>
-              <a:t>3/19/2016</a:t>
+              <a:t>5/3/2016</a:t>
             </a:fld>
             <a:endParaRPr lang="en-US"/>
           </a:p>
@@ -3550,7 +3550,7 @@
           <a:p>
             <a:fld id="{323FFD78-B649-4F70-999C-B1ECA0A6F175}" type="datetimeFigureOut">
               <a:rPr lang="en-US" smtClean="0"/>
-              <a:t>3/19/2016</a:t>
+              <a:t>5/3/2016</a:t>
             </a:fld>
             <a:endParaRPr lang="en-US"/>
           </a:p>
@@ -3904,7 +3904,7 @@
           <a:p>
             <a:fld id="{323FFD78-B649-4F70-999C-B1ECA0A6F175}" type="datetimeFigureOut">
               <a:rPr lang="en-US" smtClean="0"/>
-              <a:t>3/19/2016</a:t>
+              <a:t>5/3/2016</a:t>
             </a:fld>
             <a:endParaRPr lang="en-US"/>
           </a:p>
@@ -4281,7 +4281,7 @@
           <a:p>
             <a:fld id="{323FFD78-B649-4F70-999C-B1ECA0A6F175}" type="datetimeFigureOut">
               <a:rPr lang="en-US" smtClean="0"/>
-              <a:t>3/19/2016</a:t>
+              <a:t>5/3/2016</a:t>
             </a:fld>
             <a:endParaRPr lang="en-US"/>
           </a:p>
@@ -4568,7 +4568,7 @@
           <a:p>
             <a:fld id="{323FFD78-B649-4F70-999C-B1ECA0A6F175}" type="datetimeFigureOut">
               <a:rPr lang="en-US" smtClean="0"/>
-              <a:t>3/19/2016</a:t>
+              <a:t>5/3/2016</a:t>
             </a:fld>
             <a:endParaRPr lang="en-US"/>
           </a:p>
@@ -11061,7 +11061,15 @@
                   <a:srgbClr val="0070C0"/>
                 </a:solidFill>
               </a:rPr>
-              <a:t> module-qualified command...</a:t>
+              <a:t> module-qualified </a:t>
+            </a:r>
+            <a:r>
+              <a:rPr lang="en-US" smtClean="0">
+                <a:solidFill>
+                  <a:srgbClr val="0070C0"/>
+                </a:solidFill>
+              </a:rPr>
+              <a:t>command...</a:t>
             </a:r>
             <a:endParaRPr lang="en-US">
               <a:solidFill>
@@ -11166,7 +11174,7 @@
         </p:blipFill>
         <p:spPr>
           <a:xfrm>
-            <a:off x="546622" y="3835803"/>
+            <a:off x="586815" y="3314692"/>
             <a:ext cx="11204101" cy="2201601"/>
           </a:xfrm>
           <a:prstGeom prst="rect">
@@ -11174,6 +11182,44 @@
           </a:prstGeom>
         </p:spPr>
       </p:pic>
+      <p:sp>
+        <p:nvSpPr>
+          <p:cNvPr id="5" name="TextBox 4"/>
+          <p:cNvSpPr txBox="1"/>
+          <p:nvPr/>
+        </p:nvSpPr>
+        <p:spPr>
+          <a:xfrm>
+            <a:off x="586815" y="5878286"/>
+            <a:ext cx="4086311" cy="400110"/>
+          </a:xfrm>
+          <a:prstGeom prst="rect">
+            <a:avLst/>
+          </a:prstGeom>
+          <a:noFill/>
+        </p:spPr>
+        <p:txBody>
+          <a:bodyPr wrap="none" rtlCol="0">
+            <a:spAutoFit/>
+          </a:bodyPr>
+          <a:lstStyle/>
+          <a:p>
+            <a:r>
+              <a:rPr lang="en-US" sz="2000" smtClean="0">
+                <a:solidFill>
+                  <a:srgbClr val="FF0000"/>
+                </a:solidFill>
+              </a:rPr>
+              <a:t>* Works only for exported commands</a:t>
+            </a:r>
+            <a:endParaRPr lang="en-US" sz="2000">
+              <a:solidFill>
+                <a:srgbClr val="FF0000"/>
+              </a:solidFill>
+            </a:endParaRPr>
+          </a:p>
+        </p:txBody>
+      </p:sp>
     </p:spTree>
     <p:extLst>
       <p:ext uri="{BB962C8B-B14F-4D97-AF65-F5344CB8AC3E}">
@@ -13023,7 +13069,16 @@
                 </a:solidFill>
                 <a:latin typeface="Consolas" panose="020B0609020204030204" pitchFamily="49" charset="0"/>
               </a:rPr>
-              <a:t>Module-qualified name:</a:t>
+              <a:t>Module-qualified </a:t>
+            </a:r>
+            <a:r>
+              <a:rPr lang="en-US" sz="2400" smtClean="0">
+                <a:solidFill>
+                  <a:srgbClr val="0070C0"/>
+                </a:solidFill>
+                <a:latin typeface="Consolas" panose="020B0609020204030204" pitchFamily="49" charset="0"/>
+              </a:rPr>
+              <a:t>name:</a:t>
             </a:r>
             <a:r>
               <a:rPr lang="en-US" smtClean="0">

</xml_diff>